<commit_message>
update to powerpoint and jars
</commit_message>
<xml_diff>
--- a/Roots/Powerpoints/PresBioProj.pptx
+++ b/Roots/Powerpoints/PresBioProj.pptx
@@ -2236,6 +2236,13 @@
         </dgm:presLayoutVars>
       </dgm:prSet>
       <dgm:spPr/>
+      <dgm:t>
+        <a:bodyPr/>
+        <a:lstStyle/>
+        <a:p>
+          <a:endParaRPr lang="en-US"/>
+        </a:p>
+      </dgm:t>
     </dgm:pt>
     <dgm:pt modelId="{795BBEFF-8399-3F4B-82C9-4826139F1E35}" type="pres">
       <dgm:prSet presAssocID="{32AFFDDC-96E0-244C-9C4E-0617E7624C0C}" presName="node" presStyleLbl="node1" presStyleIdx="0" presStyleCnt="7">
@@ -2244,14 +2251,35 @@
         </dgm:presLayoutVars>
       </dgm:prSet>
       <dgm:spPr/>
+      <dgm:t>
+        <a:bodyPr/>
+        <a:lstStyle/>
+        <a:p>
+          <a:endParaRPr lang="en-US"/>
+        </a:p>
+      </dgm:t>
     </dgm:pt>
     <dgm:pt modelId="{9AD6CD1D-AB0D-4348-ABFE-8646B49EFC60}" type="pres">
       <dgm:prSet presAssocID="{B4E4A769-62AC-0E4A-B37C-AD3A7C197485}" presName="sibTrans" presStyleLbl="sibTrans2D1" presStyleIdx="0" presStyleCnt="6"/>
       <dgm:spPr/>
+      <dgm:t>
+        <a:bodyPr/>
+        <a:lstStyle/>
+        <a:p>
+          <a:endParaRPr lang="en-US"/>
+        </a:p>
+      </dgm:t>
     </dgm:pt>
     <dgm:pt modelId="{C4BB2E1E-6C4C-C641-AAE9-0C2D82F29324}" type="pres">
       <dgm:prSet presAssocID="{B4E4A769-62AC-0E4A-B37C-AD3A7C197485}" presName="connectorText" presStyleLbl="sibTrans2D1" presStyleIdx="0" presStyleCnt="6"/>
       <dgm:spPr/>
+      <dgm:t>
+        <a:bodyPr/>
+        <a:lstStyle/>
+        <a:p>
+          <a:endParaRPr lang="en-US"/>
+        </a:p>
+      </dgm:t>
     </dgm:pt>
     <dgm:pt modelId="{6ED8BBE4-6003-2C47-87C5-CE21FD960AD1}" type="pres">
       <dgm:prSet presAssocID="{C9D14ED4-62C0-AA48-97B2-73F4F06F20D3}" presName="node" presStyleLbl="node1" presStyleIdx="1" presStyleCnt="7">
@@ -2260,14 +2288,35 @@
         </dgm:presLayoutVars>
       </dgm:prSet>
       <dgm:spPr/>
+      <dgm:t>
+        <a:bodyPr/>
+        <a:lstStyle/>
+        <a:p>
+          <a:endParaRPr lang="en-US"/>
+        </a:p>
+      </dgm:t>
     </dgm:pt>
     <dgm:pt modelId="{5AE893F8-490F-714A-871B-A34C2131432B}" type="pres">
       <dgm:prSet presAssocID="{289B5442-22E4-8D44-823F-5C9E8EBC2617}" presName="sibTrans" presStyleLbl="sibTrans2D1" presStyleIdx="1" presStyleCnt="6"/>
       <dgm:spPr/>
+      <dgm:t>
+        <a:bodyPr/>
+        <a:lstStyle/>
+        <a:p>
+          <a:endParaRPr lang="en-US"/>
+        </a:p>
+      </dgm:t>
     </dgm:pt>
     <dgm:pt modelId="{AC262F52-0921-EA48-8D39-E2ACEBA36EEC}" type="pres">
       <dgm:prSet presAssocID="{289B5442-22E4-8D44-823F-5C9E8EBC2617}" presName="connectorText" presStyleLbl="sibTrans2D1" presStyleIdx="1" presStyleCnt="6"/>
       <dgm:spPr/>
+      <dgm:t>
+        <a:bodyPr/>
+        <a:lstStyle/>
+        <a:p>
+          <a:endParaRPr lang="en-US"/>
+        </a:p>
+      </dgm:t>
     </dgm:pt>
     <dgm:pt modelId="{0EADB85D-19BD-104A-AE7B-A316985B92AF}" type="pres">
       <dgm:prSet presAssocID="{DB39952B-AAD5-244B-953B-CF442E8307FC}" presName="node" presStyleLbl="node1" presStyleIdx="2" presStyleCnt="7">
@@ -2276,14 +2325,35 @@
         </dgm:presLayoutVars>
       </dgm:prSet>
       <dgm:spPr/>
+      <dgm:t>
+        <a:bodyPr/>
+        <a:lstStyle/>
+        <a:p>
+          <a:endParaRPr lang="en-US"/>
+        </a:p>
+      </dgm:t>
     </dgm:pt>
     <dgm:pt modelId="{64AD7205-538A-8242-B3DD-92CF99700121}" type="pres">
       <dgm:prSet presAssocID="{AF40D953-F0EE-3642-AED6-79E31621A67C}" presName="sibTrans" presStyleLbl="sibTrans2D1" presStyleIdx="2" presStyleCnt="6"/>
       <dgm:spPr/>
+      <dgm:t>
+        <a:bodyPr/>
+        <a:lstStyle/>
+        <a:p>
+          <a:endParaRPr lang="en-US"/>
+        </a:p>
+      </dgm:t>
     </dgm:pt>
     <dgm:pt modelId="{ABF40DB4-B2EB-CA4B-A2FD-5085A81838ED}" type="pres">
       <dgm:prSet presAssocID="{AF40D953-F0EE-3642-AED6-79E31621A67C}" presName="connectorText" presStyleLbl="sibTrans2D1" presStyleIdx="2" presStyleCnt="6"/>
       <dgm:spPr/>
+      <dgm:t>
+        <a:bodyPr/>
+        <a:lstStyle/>
+        <a:p>
+          <a:endParaRPr lang="en-US"/>
+        </a:p>
+      </dgm:t>
     </dgm:pt>
     <dgm:pt modelId="{7EA418D2-DB6C-7949-864D-67C07FEA2084}" type="pres">
       <dgm:prSet presAssocID="{3D712C07-4A23-6E44-AFEC-97AE3A7A3DB4}" presName="node" presStyleLbl="node1" presStyleIdx="3" presStyleCnt="7">
@@ -2292,14 +2362,35 @@
         </dgm:presLayoutVars>
       </dgm:prSet>
       <dgm:spPr/>
+      <dgm:t>
+        <a:bodyPr/>
+        <a:lstStyle/>
+        <a:p>
+          <a:endParaRPr lang="en-US"/>
+        </a:p>
+      </dgm:t>
     </dgm:pt>
     <dgm:pt modelId="{E01D001D-B0F6-2246-89C5-0C9361C11D86}" type="pres">
       <dgm:prSet presAssocID="{2CA59B4F-2562-554D-BAAF-F475A7B7EF48}" presName="sibTrans" presStyleLbl="sibTrans2D1" presStyleIdx="3" presStyleCnt="6"/>
       <dgm:spPr/>
+      <dgm:t>
+        <a:bodyPr/>
+        <a:lstStyle/>
+        <a:p>
+          <a:endParaRPr lang="en-US"/>
+        </a:p>
+      </dgm:t>
     </dgm:pt>
     <dgm:pt modelId="{D0254E01-9B87-184F-B53B-F4F793FF56CE}" type="pres">
       <dgm:prSet presAssocID="{2CA59B4F-2562-554D-BAAF-F475A7B7EF48}" presName="connectorText" presStyleLbl="sibTrans2D1" presStyleIdx="3" presStyleCnt="6"/>
       <dgm:spPr/>
+      <dgm:t>
+        <a:bodyPr/>
+        <a:lstStyle/>
+        <a:p>
+          <a:endParaRPr lang="en-US"/>
+        </a:p>
+      </dgm:t>
     </dgm:pt>
     <dgm:pt modelId="{83603312-CEFB-D341-926F-FF06E5AE3FE7}" type="pres">
       <dgm:prSet presAssocID="{D3F97A54-79BD-6347-BE91-EC947935BAC9}" presName="node" presStyleLbl="node1" presStyleIdx="4" presStyleCnt="7">
@@ -2308,14 +2399,35 @@
         </dgm:presLayoutVars>
       </dgm:prSet>
       <dgm:spPr/>
+      <dgm:t>
+        <a:bodyPr/>
+        <a:lstStyle/>
+        <a:p>
+          <a:endParaRPr lang="en-US"/>
+        </a:p>
+      </dgm:t>
     </dgm:pt>
     <dgm:pt modelId="{09C87EDC-194F-2040-A9A7-D66B4CC79599}" type="pres">
       <dgm:prSet presAssocID="{54A5D0FD-A8FC-D643-8A20-581AD861528E}" presName="sibTrans" presStyleLbl="sibTrans2D1" presStyleIdx="4" presStyleCnt="6"/>
       <dgm:spPr/>
+      <dgm:t>
+        <a:bodyPr/>
+        <a:lstStyle/>
+        <a:p>
+          <a:endParaRPr lang="en-US"/>
+        </a:p>
+      </dgm:t>
     </dgm:pt>
     <dgm:pt modelId="{DAF524D1-0DF8-6946-90AD-41DDB3014D1B}" type="pres">
       <dgm:prSet presAssocID="{54A5D0FD-A8FC-D643-8A20-581AD861528E}" presName="connectorText" presStyleLbl="sibTrans2D1" presStyleIdx="4" presStyleCnt="6"/>
       <dgm:spPr/>
+      <dgm:t>
+        <a:bodyPr/>
+        <a:lstStyle/>
+        <a:p>
+          <a:endParaRPr lang="en-US"/>
+        </a:p>
+      </dgm:t>
     </dgm:pt>
     <dgm:pt modelId="{8E9570FB-07D5-AC4B-8789-52C4E8C1DBE7}" type="pres">
       <dgm:prSet presAssocID="{2309D8F5-D20F-5241-BF28-BB68D9413BF9}" presName="node" presStyleLbl="node1" presStyleIdx="5" presStyleCnt="7">
@@ -2324,14 +2436,35 @@
         </dgm:presLayoutVars>
       </dgm:prSet>
       <dgm:spPr/>
+      <dgm:t>
+        <a:bodyPr/>
+        <a:lstStyle/>
+        <a:p>
+          <a:endParaRPr lang="en-US"/>
+        </a:p>
+      </dgm:t>
     </dgm:pt>
     <dgm:pt modelId="{93B48FD2-523E-EC4B-AF38-616669C7374B}" type="pres">
       <dgm:prSet presAssocID="{A15AF577-EF0D-0841-8D7C-712F2BFB9D33}" presName="sibTrans" presStyleLbl="sibTrans2D1" presStyleIdx="5" presStyleCnt="6"/>
       <dgm:spPr/>
+      <dgm:t>
+        <a:bodyPr/>
+        <a:lstStyle/>
+        <a:p>
+          <a:endParaRPr lang="en-US"/>
+        </a:p>
+      </dgm:t>
     </dgm:pt>
     <dgm:pt modelId="{0776E77E-2871-9C4B-A3E3-FB7A03745CDD}" type="pres">
       <dgm:prSet presAssocID="{A15AF577-EF0D-0841-8D7C-712F2BFB9D33}" presName="connectorText" presStyleLbl="sibTrans2D1" presStyleIdx="5" presStyleCnt="6"/>
       <dgm:spPr/>
+      <dgm:t>
+        <a:bodyPr/>
+        <a:lstStyle/>
+        <a:p>
+          <a:endParaRPr lang="en-US"/>
+        </a:p>
+      </dgm:t>
     </dgm:pt>
     <dgm:pt modelId="{FEBA3F4F-1690-3E41-8256-86ABBC7CFEA3}" type="pres">
       <dgm:prSet presAssocID="{78BF26F0-2444-9043-9A0D-D146215CE225}" presName="node" presStyleLbl="node1" presStyleIdx="6" presStyleCnt="7">
@@ -2350,33 +2483,33 @@
     </dgm:pt>
   </dgm:ptLst>
   <dgm:cxnLst>
+    <dgm:cxn modelId="{5AF14CE8-8609-BF4D-A56A-0466098F8BB2}" srcId="{D066B18C-80D4-724B-9060-41E458B6161E}" destId="{D3F97A54-79BD-6347-BE91-EC947935BAC9}" srcOrd="4" destOrd="0" parTransId="{0BB78EE4-2289-A64E-8064-81396939D63F}" sibTransId="{54A5D0FD-A8FC-D643-8A20-581AD861528E}"/>
+    <dgm:cxn modelId="{C43D7F66-FEE3-4446-AB48-BECC277D9B5C}" type="presOf" srcId="{B4E4A769-62AC-0E4A-B37C-AD3A7C197485}" destId="{C4BB2E1E-6C4C-C641-AAE9-0C2D82F29324}" srcOrd="1" destOrd="0" presId="urn:microsoft.com/office/officeart/2005/8/layout/process1"/>
+    <dgm:cxn modelId="{22EF0246-FFC6-6B4C-AC44-473C90FF8D58}" type="presOf" srcId="{32AFFDDC-96E0-244C-9C4E-0617E7624C0C}" destId="{795BBEFF-8399-3F4B-82C9-4826139F1E35}" srcOrd="0" destOrd="0" presId="urn:microsoft.com/office/officeart/2005/8/layout/process1"/>
+    <dgm:cxn modelId="{ACB35B40-D60F-2B4A-A2C4-B2E6120E22E0}" type="presOf" srcId="{D3F97A54-79BD-6347-BE91-EC947935BAC9}" destId="{83603312-CEFB-D341-926F-FF06E5AE3FE7}" srcOrd="0" destOrd="0" presId="urn:microsoft.com/office/officeart/2005/8/layout/process1"/>
+    <dgm:cxn modelId="{12539C23-CA5A-6C4A-811C-853B5BA0C4AA}" type="presOf" srcId="{B4E4A769-62AC-0E4A-B37C-AD3A7C197485}" destId="{9AD6CD1D-AB0D-4348-ABFE-8646B49EFC60}" srcOrd="0" destOrd="0" presId="urn:microsoft.com/office/officeart/2005/8/layout/process1"/>
     <dgm:cxn modelId="{BCBC92E7-3172-2745-9F15-D60D67F49BCC}" type="presOf" srcId="{AF40D953-F0EE-3642-AED6-79E31621A67C}" destId="{64AD7205-538A-8242-B3DD-92CF99700121}" srcOrd="0" destOrd="0" presId="urn:microsoft.com/office/officeart/2005/8/layout/process1"/>
-    <dgm:cxn modelId="{371C843C-06AC-BA47-A25D-4F169B42CECA}" type="presOf" srcId="{54A5D0FD-A8FC-D643-8A20-581AD861528E}" destId="{DAF524D1-0DF8-6946-90AD-41DDB3014D1B}" srcOrd="1" destOrd="0" presId="urn:microsoft.com/office/officeart/2005/8/layout/process1"/>
+    <dgm:cxn modelId="{42137107-AC7E-9848-8DD5-4DEDE0002482}" srcId="{D066B18C-80D4-724B-9060-41E458B6161E}" destId="{2309D8F5-D20F-5241-BF28-BB68D9413BF9}" srcOrd="5" destOrd="0" parTransId="{C6A9BE56-946F-E941-B942-C73B2783251C}" sibTransId="{A15AF577-EF0D-0841-8D7C-712F2BFB9D33}"/>
+    <dgm:cxn modelId="{38A00726-881C-024F-8323-0E0A54EC1254}" srcId="{D066B18C-80D4-724B-9060-41E458B6161E}" destId="{DB39952B-AAD5-244B-953B-CF442E8307FC}" srcOrd="2" destOrd="0" parTransId="{FCABDEA3-04AB-934D-9BC7-EEB35718CD55}" sibTransId="{AF40D953-F0EE-3642-AED6-79E31621A67C}"/>
+    <dgm:cxn modelId="{EBBB4220-571A-3543-99D9-A3F7AD301E36}" type="presOf" srcId="{DB39952B-AAD5-244B-953B-CF442E8307FC}" destId="{0EADB85D-19BD-104A-AE7B-A316985B92AF}" srcOrd="0" destOrd="0" presId="urn:microsoft.com/office/officeart/2005/8/layout/process1"/>
+    <dgm:cxn modelId="{2F7B2298-8AED-B149-B77F-871E0AAFC78B}" type="presOf" srcId="{A15AF577-EF0D-0841-8D7C-712F2BFB9D33}" destId="{0776E77E-2871-9C4B-A3E3-FB7A03745CDD}" srcOrd="1" destOrd="0" presId="urn:microsoft.com/office/officeart/2005/8/layout/process1"/>
+    <dgm:cxn modelId="{4FC349A8-69EB-244C-B8B1-DC20EF4F97B0}" type="presOf" srcId="{289B5442-22E4-8D44-823F-5C9E8EBC2617}" destId="{5AE893F8-490F-714A-871B-A34C2131432B}" srcOrd="0" destOrd="0" presId="urn:microsoft.com/office/officeart/2005/8/layout/process1"/>
     <dgm:cxn modelId="{64905A95-B305-2342-A31F-E24705BED7E9}" type="presOf" srcId="{C9D14ED4-62C0-AA48-97B2-73F4F06F20D3}" destId="{6ED8BBE4-6003-2C47-87C5-CE21FD960AD1}" srcOrd="0" destOrd="0" presId="urn:microsoft.com/office/officeart/2005/8/layout/process1"/>
+    <dgm:cxn modelId="{4F8A4674-C19D-6849-957E-57A06782AE38}" type="presOf" srcId="{AF40D953-F0EE-3642-AED6-79E31621A67C}" destId="{ABF40DB4-B2EB-CA4B-A2FD-5085A81838ED}" srcOrd="1" destOrd="0" presId="urn:microsoft.com/office/officeart/2005/8/layout/process1"/>
+    <dgm:cxn modelId="{E64E52FD-2F32-D247-9340-88994877F7B6}" srcId="{D066B18C-80D4-724B-9060-41E458B6161E}" destId="{32AFFDDC-96E0-244C-9C4E-0617E7624C0C}" srcOrd="0" destOrd="0" parTransId="{3EFBF99E-20D5-F845-9244-26A109948CFD}" sibTransId="{B4E4A769-62AC-0E4A-B37C-AD3A7C197485}"/>
+    <dgm:cxn modelId="{B8F9E9B0-34CE-EA46-86B4-B1FA39846859}" type="presOf" srcId="{A15AF577-EF0D-0841-8D7C-712F2BFB9D33}" destId="{93B48FD2-523E-EC4B-AF38-616669C7374B}" srcOrd="0" destOrd="0" presId="urn:microsoft.com/office/officeart/2005/8/layout/process1"/>
+    <dgm:cxn modelId="{DDAAD26C-5879-364B-968E-F347541F3192}" type="presOf" srcId="{2309D8F5-D20F-5241-BF28-BB68D9413BF9}" destId="{8E9570FB-07D5-AC4B-8789-52C4E8C1DBE7}" srcOrd="0" destOrd="0" presId="urn:microsoft.com/office/officeart/2005/8/layout/process1"/>
     <dgm:cxn modelId="{253B6499-B16F-2B47-91E4-39B0C83C4FD6}" type="presOf" srcId="{2CA59B4F-2562-554D-BAAF-F475A7B7EF48}" destId="{E01D001D-B0F6-2246-89C5-0C9361C11D86}" srcOrd="0" destOrd="0" presId="urn:microsoft.com/office/officeart/2005/8/layout/process1"/>
     <dgm:cxn modelId="{4C3835D0-3FB0-9341-A282-A9B3E4CC337C}" type="presOf" srcId="{D066B18C-80D4-724B-9060-41E458B6161E}" destId="{6BBE2943-C4C4-A744-9C08-8D75B7B992C1}" srcOrd="0" destOrd="0" presId="urn:microsoft.com/office/officeart/2005/8/layout/process1"/>
-    <dgm:cxn modelId="{42137107-AC7E-9848-8DD5-4DEDE0002482}" srcId="{D066B18C-80D4-724B-9060-41E458B6161E}" destId="{2309D8F5-D20F-5241-BF28-BB68D9413BF9}" srcOrd="5" destOrd="0" parTransId="{C6A9BE56-946F-E941-B942-C73B2783251C}" sibTransId="{A15AF577-EF0D-0841-8D7C-712F2BFB9D33}"/>
-    <dgm:cxn modelId="{4FC349A8-69EB-244C-B8B1-DC20EF4F97B0}" type="presOf" srcId="{289B5442-22E4-8D44-823F-5C9E8EBC2617}" destId="{5AE893F8-490F-714A-871B-A34C2131432B}" srcOrd="0" destOrd="0" presId="urn:microsoft.com/office/officeart/2005/8/layout/process1"/>
+    <dgm:cxn modelId="{213D20FF-752B-C045-BA35-0744B438C7E3}" type="presOf" srcId="{78BF26F0-2444-9043-9A0D-D146215CE225}" destId="{FEBA3F4F-1690-3E41-8256-86ABBC7CFEA3}" srcOrd="0" destOrd="0" presId="urn:microsoft.com/office/officeart/2005/8/layout/process1"/>
+    <dgm:cxn modelId="{20191E9E-C9D8-F744-87DF-CBBCF3A49E38}" type="presOf" srcId="{289B5442-22E4-8D44-823F-5C9E8EBC2617}" destId="{AC262F52-0921-EA48-8D39-E2ACEBA36EEC}" srcOrd="1" destOrd="0" presId="urn:microsoft.com/office/officeart/2005/8/layout/process1"/>
+    <dgm:cxn modelId="{0279497C-9963-D348-BE03-FD6350F23C2B}" type="presOf" srcId="{3D712C07-4A23-6E44-AFEC-97AE3A7A3DB4}" destId="{7EA418D2-DB6C-7949-864D-67C07FEA2084}" srcOrd="0" destOrd="0" presId="urn:microsoft.com/office/officeart/2005/8/layout/process1"/>
+    <dgm:cxn modelId="{29A85E57-30BE-3B41-9157-862BC40D68A3}" type="presOf" srcId="{2CA59B4F-2562-554D-BAAF-F475A7B7EF48}" destId="{D0254E01-9B87-184F-B53B-F4F793FF56CE}" srcOrd="1" destOrd="0" presId="urn:microsoft.com/office/officeart/2005/8/layout/process1"/>
     <dgm:cxn modelId="{EB26BE98-9234-6F4C-BEC9-349229DEB8F2}" srcId="{D066B18C-80D4-724B-9060-41E458B6161E}" destId="{C9D14ED4-62C0-AA48-97B2-73F4F06F20D3}" srcOrd="1" destOrd="0" parTransId="{90757359-1A11-3246-ADB0-BC720792784C}" sibTransId="{289B5442-22E4-8D44-823F-5C9E8EBC2617}"/>
-    <dgm:cxn modelId="{0279497C-9963-D348-BE03-FD6350F23C2B}" type="presOf" srcId="{3D712C07-4A23-6E44-AFEC-97AE3A7A3DB4}" destId="{7EA418D2-DB6C-7949-864D-67C07FEA2084}" srcOrd="0" destOrd="0" presId="urn:microsoft.com/office/officeart/2005/8/layout/process1"/>
-    <dgm:cxn modelId="{DDAAD26C-5879-364B-968E-F347541F3192}" type="presOf" srcId="{2309D8F5-D20F-5241-BF28-BB68D9413BF9}" destId="{8E9570FB-07D5-AC4B-8789-52C4E8C1DBE7}" srcOrd="0" destOrd="0" presId="urn:microsoft.com/office/officeart/2005/8/layout/process1"/>
-    <dgm:cxn modelId="{12539C23-CA5A-6C4A-811C-853B5BA0C4AA}" type="presOf" srcId="{B4E4A769-62AC-0E4A-B37C-AD3A7C197485}" destId="{9AD6CD1D-AB0D-4348-ABFE-8646B49EFC60}" srcOrd="0" destOrd="0" presId="urn:microsoft.com/office/officeart/2005/8/layout/process1"/>
-    <dgm:cxn modelId="{B8F9E9B0-34CE-EA46-86B4-B1FA39846859}" type="presOf" srcId="{A15AF577-EF0D-0841-8D7C-712F2BFB9D33}" destId="{93B48FD2-523E-EC4B-AF38-616669C7374B}" srcOrd="0" destOrd="0" presId="urn:microsoft.com/office/officeart/2005/8/layout/process1"/>
-    <dgm:cxn modelId="{E64E52FD-2F32-D247-9340-88994877F7B6}" srcId="{D066B18C-80D4-724B-9060-41E458B6161E}" destId="{32AFFDDC-96E0-244C-9C4E-0617E7624C0C}" srcOrd="0" destOrd="0" parTransId="{3EFBF99E-20D5-F845-9244-26A109948CFD}" sibTransId="{B4E4A769-62AC-0E4A-B37C-AD3A7C197485}"/>
-    <dgm:cxn modelId="{29A85E57-30BE-3B41-9157-862BC40D68A3}" type="presOf" srcId="{2CA59B4F-2562-554D-BAAF-F475A7B7EF48}" destId="{D0254E01-9B87-184F-B53B-F4F793FF56CE}" srcOrd="1" destOrd="0" presId="urn:microsoft.com/office/officeart/2005/8/layout/process1"/>
-    <dgm:cxn modelId="{ACB35B40-D60F-2B4A-A2C4-B2E6120E22E0}" type="presOf" srcId="{D3F97A54-79BD-6347-BE91-EC947935BAC9}" destId="{83603312-CEFB-D341-926F-FF06E5AE3FE7}" srcOrd="0" destOrd="0" presId="urn:microsoft.com/office/officeart/2005/8/layout/process1"/>
     <dgm:cxn modelId="{246990C3-3313-144F-8C58-7BE79E5D6232}" srcId="{D066B18C-80D4-724B-9060-41E458B6161E}" destId="{78BF26F0-2444-9043-9A0D-D146215CE225}" srcOrd="6" destOrd="0" parTransId="{3D2B913F-1406-244E-B886-B38D4E0BCB3B}" sibTransId="{31943F3E-35B6-0A4C-9E39-5FD03EF39018}"/>
     <dgm:cxn modelId="{C1B3B7C5-3ACC-504F-8123-2B143E4AB503}" srcId="{D066B18C-80D4-724B-9060-41E458B6161E}" destId="{3D712C07-4A23-6E44-AFEC-97AE3A7A3DB4}" srcOrd="3" destOrd="0" parTransId="{9B0B6506-5E70-A04A-A0F5-BFD513053889}" sibTransId="{2CA59B4F-2562-554D-BAAF-F475A7B7EF48}"/>
-    <dgm:cxn modelId="{4F8A4674-C19D-6849-957E-57A06782AE38}" type="presOf" srcId="{AF40D953-F0EE-3642-AED6-79E31621A67C}" destId="{ABF40DB4-B2EB-CA4B-A2FD-5085A81838ED}" srcOrd="1" destOrd="0" presId="urn:microsoft.com/office/officeart/2005/8/layout/process1"/>
-    <dgm:cxn modelId="{22EF0246-FFC6-6B4C-AC44-473C90FF8D58}" type="presOf" srcId="{32AFFDDC-96E0-244C-9C4E-0617E7624C0C}" destId="{795BBEFF-8399-3F4B-82C9-4826139F1E35}" srcOrd="0" destOrd="0" presId="urn:microsoft.com/office/officeart/2005/8/layout/process1"/>
-    <dgm:cxn modelId="{2F7B2298-8AED-B149-B77F-871E0AAFC78B}" type="presOf" srcId="{A15AF577-EF0D-0841-8D7C-712F2BFB9D33}" destId="{0776E77E-2871-9C4B-A3E3-FB7A03745CDD}" srcOrd="1" destOrd="0" presId="urn:microsoft.com/office/officeart/2005/8/layout/process1"/>
-    <dgm:cxn modelId="{C43D7F66-FEE3-4446-AB48-BECC277D9B5C}" type="presOf" srcId="{B4E4A769-62AC-0E4A-B37C-AD3A7C197485}" destId="{C4BB2E1E-6C4C-C641-AAE9-0C2D82F29324}" srcOrd="1" destOrd="0" presId="urn:microsoft.com/office/officeart/2005/8/layout/process1"/>
-    <dgm:cxn modelId="{213D20FF-752B-C045-BA35-0744B438C7E3}" type="presOf" srcId="{78BF26F0-2444-9043-9A0D-D146215CE225}" destId="{FEBA3F4F-1690-3E41-8256-86ABBC7CFEA3}" srcOrd="0" destOrd="0" presId="urn:microsoft.com/office/officeart/2005/8/layout/process1"/>
     <dgm:cxn modelId="{9BF6CCE9-6EC2-2B4C-B3EE-CDAB1DFD02DB}" type="presOf" srcId="{54A5D0FD-A8FC-D643-8A20-581AD861528E}" destId="{09C87EDC-194F-2040-A9A7-D66B4CC79599}" srcOrd="0" destOrd="0" presId="urn:microsoft.com/office/officeart/2005/8/layout/process1"/>
-    <dgm:cxn modelId="{38A00726-881C-024F-8323-0E0A54EC1254}" srcId="{D066B18C-80D4-724B-9060-41E458B6161E}" destId="{DB39952B-AAD5-244B-953B-CF442E8307FC}" srcOrd="2" destOrd="0" parTransId="{FCABDEA3-04AB-934D-9BC7-EEB35718CD55}" sibTransId="{AF40D953-F0EE-3642-AED6-79E31621A67C}"/>
-    <dgm:cxn modelId="{EBBB4220-571A-3543-99D9-A3F7AD301E36}" type="presOf" srcId="{DB39952B-AAD5-244B-953B-CF442E8307FC}" destId="{0EADB85D-19BD-104A-AE7B-A316985B92AF}" srcOrd="0" destOrd="0" presId="urn:microsoft.com/office/officeart/2005/8/layout/process1"/>
-    <dgm:cxn modelId="{5AF14CE8-8609-BF4D-A56A-0466098F8BB2}" srcId="{D066B18C-80D4-724B-9060-41E458B6161E}" destId="{D3F97A54-79BD-6347-BE91-EC947935BAC9}" srcOrd="4" destOrd="0" parTransId="{0BB78EE4-2289-A64E-8064-81396939D63F}" sibTransId="{54A5D0FD-A8FC-D643-8A20-581AD861528E}"/>
-    <dgm:cxn modelId="{20191E9E-C9D8-F744-87DF-CBBCF3A49E38}" type="presOf" srcId="{289B5442-22E4-8D44-823F-5C9E8EBC2617}" destId="{AC262F52-0921-EA48-8D39-E2ACEBA36EEC}" srcOrd="1" destOrd="0" presId="urn:microsoft.com/office/officeart/2005/8/layout/process1"/>
+    <dgm:cxn modelId="{371C843C-06AC-BA47-A25D-4F169B42CECA}" type="presOf" srcId="{54A5D0FD-A8FC-D643-8A20-581AD861528E}" destId="{DAF524D1-0DF8-6946-90AD-41DDB3014D1B}" srcOrd="1" destOrd="0" presId="urn:microsoft.com/office/officeart/2005/8/layout/process1"/>
     <dgm:cxn modelId="{660E138A-5135-5044-A749-B10C10C8054C}" type="presParOf" srcId="{6BBE2943-C4C4-A744-9C08-8D75B7B992C1}" destId="{795BBEFF-8399-3F4B-82C9-4826139F1E35}" srcOrd="0" destOrd="0" presId="urn:microsoft.com/office/officeart/2005/8/layout/process1"/>
     <dgm:cxn modelId="{E064E9CC-EC3B-1D49-A635-F40E0CC9DC3A}" type="presParOf" srcId="{6BBE2943-C4C4-A744-9C08-8D75B7B992C1}" destId="{9AD6CD1D-AB0D-4348-ABFE-8646B49EFC60}" srcOrd="1" destOrd="0" presId="urn:microsoft.com/office/officeart/2005/8/layout/process1"/>
     <dgm:cxn modelId="{F825CC79-5A9A-9840-BDF9-D05AC0403282}" type="presParOf" srcId="{9AD6CD1D-AB0D-4348-ABFE-8646B49EFC60}" destId="{C4BB2E1E-6C4C-C641-AAE9-0C2D82F29324}" srcOrd="0" destOrd="0" presId="urn:microsoft.com/office/officeart/2005/8/layout/process1"/>
@@ -2589,10 +2722,24 @@
     <dgm:pt modelId="{302C9ED6-3EF6-A04A-A98F-7A577D6896F9}" type="pres">
       <dgm:prSet presAssocID="{E6DFE555-0069-9E4D-8E5B-77B1887F5C3E}" presName="sibTrans" presStyleLbl="sibTrans2D1" presStyleIdx="0" presStyleCnt="3"/>
       <dgm:spPr/>
+      <dgm:t>
+        <a:bodyPr/>
+        <a:lstStyle/>
+        <a:p>
+          <a:endParaRPr lang="en-US"/>
+        </a:p>
+      </dgm:t>
     </dgm:pt>
     <dgm:pt modelId="{678874ED-5C0F-964A-97B1-D30ABE47E41F}" type="pres">
       <dgm:prSet presAssocID="{E6DFE555-0069-9E4D-8E5B-77B1887F5C3E}" presName="connectorText" presStyleLbl="sibTrans2D1" presStyleIdx="0" presStyleCnt="3"/>
       <dgm:spPr/>
+      <dgm:t>
+        <a:bodyPr/>
+        <a:lstStyle/>
+        <a:p>
+          <a:endParaRPr lang="en-US"/>
+        </a:p>
+      </dgm:t>
     </dgm:pt>
     <dgm:pt modelId="{4FCDE146-88C5-A94E-A1B9-23F5E7BF7536}" type="pres">
       <dgm:prSet presAssocID="{6A7A875F-4394-0B40-9758-0CFDD6C55FE4}" presName="node" presStyleLbl="node1" presStyleIdx="1" presStyleCnt="4">
@@ -2612,10 +2759,24 @@
     <dgm:pt modelId="{9C03E513-11AB-1148-9211-7650583DF686}" type="pres">
       <dgm:prSet presAssocID="{D54BB76F-8CD5-6740-B92A-F752CBE3D216}" presName="sibTrans" presStyleLbl="sibTrans2D1" presStyleIdx="1" presStyleCnt="3"/>
       <dgm:spPr/>
+      <dgm:t>
+        <a:bodyPr/>
+        <a:lstStyle/>
+        <a:p>
+          <a:endParaRPr lang="en-US"/>
+        </a:p>
+      </dgm:t>
     </dgm:pt>
     <dgm:pt modelId="{B07BBFF5-8EF9-6748-8756-6CEAEC103A47}" type="pres">
       <dgm:prSet presAssocID="{D54BB76F-8CD5-6740-B92A-F752CBE3D216}" presName="connectorText" presStyleLbl="sibTrans2D1" presStyleIdx="1" presStyleCnt="3"/>
       <dgm:spPr/>
+      <dgm:t>
+        <a:bodyPr/>
+        <a:lstStyle/>
+        <a:p>
+          <a:endParaRPr lang="en-US"/>
+        </a:p>
+      </dgm:t>
     </dgm:pt>
     <dgm:pt modelId="{66B397A5-31BB-7E47-B7AC-C886C844D54C}" type="pres">
       <dgm:prSet presAssocID="{5CBE3E40-A51B-A347-AA7D-FE972F4A854E}" presName="node" presStyleLbl="node1" presStyleIdx="2" presStyleCnt="4">
@@ -2624,14 +2785,35 @@
         </dgm:presLayoutVars>
       </dgm:prSet>
       <dgm:spPr/>
+      <dgm:t>
+        <a:bodyPr/>
+        <a:lstStyle/>
+        <a:p>
+          <a:endParaRPr lang="en-US"/>
+        </a:p>
+      </dgm:t>
     </dgm:pt>
     <dgm:pt modelId="{C7FAAE15-C569-E348-A0C4-D51228C93A74}" type="pres">
       <dgm:prSet presAssocID="{4019908C-57A4-4D48-86A3-1368FA9CE053}" presName="sibTrans" presStyleLbl="sibTrans2D1" presStyleIdx="2" presStyleCnt="3"/>
       <dgm:spPr/>
+      <dgm:t>
+        <a:bodyPr/>
+        <a:lstStyle/>
+        <a:p>
+          <a:endParaRPr lang="en-US"/>
+        </a:p>
+      </dgm:t>
     </dgm:pt>
     <dgm:pt modelId="{08A9404F-3A6E-7644-8CFA-4A60B74BFE32}" type="pres">
       <dgm:prSet presAssocID="{4019908C-57A4-4D48-86A3-1368FA9CE053}" presName="connectorText" presStyleLbl="sibTrans2D1" presStyleIdx="2" presStyleCnt="3"/>
       <dgm:spPr/>
+      <dgm:t>
+        <a:bodyPr/>
+        <a:lstStyle/>
+        <a:p>
+          <a:endParaRPr lang="en-US"/>
+        </a:p>
+      </dgm:t>
     </dgm:pt>
     <dgm:pt modelId="{30727B0D-A5A2-6040-832D-1FEA51B39211}" type="pres">
       <dgm:prSet presAssocID="{7A4E99D3-588D-3546-BA01-6122DABE3037}" presName="node" presStyleLbl="node1" presStyleIdx="3" presStyleCnt="4">
@@ -2640,24 +2822,31 @@
         </dgm:presLayoutVars>
       </dgm:prSet>
       <dgm:spPr/>
+      <dgm:t>
+        <a:bodyPr/>
+        <a:lstStyle/>
+        <a:p>
+          <a:endParaRPr lang="en-US"/>
+        </a:p>
+      </dgm:t>
     </dgm:pt>
   </dgm:ptLst>
   <dgm:cxnLst>
+    <dgm:cxn modelId="{DD434E98-717C-8A48-81C5-FC0B053F8A1E}" type="presOf" srcId="{E6DFE555-0069-9E4D-8E5B-77B1887F5C3E}" destId="{302C9ED6-3EF6-A04A-A98F-7A577D6896F9}" srcOrd="0" destOrd="0" presId="urn:microsoft.com/office/officeart/2005/8/layout/process1"/>
     <dgm:cxn modelId="{3097542B-FCDD-8D44-93BD-CA9E4633E7CA}" type="presOf" srcId="{6A7A875F-4394-0B40-9758-0CFDD6C55FE4}" destId="{4FCDE146-88C5-A94E-A1B9-23F5E7BF7536}" srcOrd="0" destOrd="0" presId="urn:microsoft.com/office/officeart/2005/8/layout/process1"/>
+    <dgm:cxn modelId="{AEE7B1BC-6AC0-B94B-B6A7-38F633148F3D}" srcId="{CAE66A96-6D2D-4E48-993F-20FD0D8835A2}" destId="{5CBE3E40-A51B-A347-AA7D-FE972F4A854E}" srcOrd="2" destOrd="0" parTransId="{CC895081-7172-0A4A-A3A8-7860BCB1D6D7}" sibTransId="{4019908C-57A4-4D48-86A3-1368FA9CE053}"/>
     <dgm:cxn modelId="{40BEE70E-06F2-B749-940B-2FA7CAB6E592}" srcId="{CAE66A96-6D2D-4E48-993F-20FD0D8835A2}" destId="{7A4E99D3-588D-3546-BA01-6122DABE3037}" srcOrd="3" destOrd="0" parTransId="{03F14382-1AB5-C141-B060-7C9D45A49ED2}" sibTransId="{A408FF34-E54E-3B44-BF37-033881DED699}"/>
+    <dgm:cxn modelId="{882B2162-D62E-DC44-88ED-F3FED9879E73}" type="presOf" srcId="{4019908C-57A4-4D48-86A3-1368FA9CE053}" destId="{C7FAAE15-C569-E348-A0C4-D51228C93A74}" srcOrd="0" destOrd="0" presId="urn:microsoft.com/office/officeart/2005/8/layout/process1"/>
     <dgm:cxn modelId="{53B0F656-451B-A24B-A154-7BF35FA7AA91}" type="presOf" srcId="{4019908C-57A4-4D48-86A3-1368FA9CE053}" destId="{08A9404F-3A6E-7644-8CFA-4A60B74BFE32}" srcOrd="1" destOrd="0" presId="urn:microsoft.com/office/officeart/2005/8/layout/process1"/>
+    <dgm:cxn modelId="{04AC0B24-7831-FF4B-B39D-A488E150D879}" type="presOf" srcId="{5CBE3E40-A51B-A347-AA7D-FE972F4A854E}" destId="{66B397A5-31BB-7E47-B7AC-C886C844D54C}" srcOrd="0" destOrd="0" presId="urn:microsoft.com/office/officeart/2005/8/layout/process1"/>
     <dgm:cxn modelId="{23115F28-EB65-9C4E-B24D-A88B0D6F7B32}" type="presOf" srcId="{CAE66A96-6D2D-4E48-993F-20FD0D8835A2}" destId="{2CD4D39A-1097-8249-9825-6CD1BEDFF85A}" srcOrd="0" destOrd="0" presId="urn:microsoft.com/office/officeart/2005/8/layout/process1"/>
-    <dgm:cxn modelId="{AEE7B1BC-6AC0-B94B-B6A7-38F633148F3D}" srcId="{CAE66A96-6D2D-4E48-993F-20FD0D8835A2}" destId="{5CBE3E40-A51B-A347-AA7D-FE972F4A854E}" srcOrd="2" destOrd="0" parTransId="{CC895081-7172-0A4A-A3A8-7860BCB1D6D7}" sibTransId="{4019908C-57A4-4D48-86A3-1368FA9CE053}"/>
-    <dgm:cxn modelId="{DD434E98-717C-8A48-81C5-FC0B053F8A1E}" type="presOf" srcId="{E6DFE555-0069-9E4D-8E5B-77B1887F5C3E}" destId="{302C9ED6-3EF6-A04A-A98F-7A577D6896F9}" srcOrd="0" destOrd="0" presId="urn:microsoft.com/office/officeart/2005/8/layout/process1"/>
+    <dgm:cxn modelId="{52469562-9EE7-244E-900F-862205684F68}" type="presOf" srcId="{7A4E99D3-588D-3546-BA01-6122DABE3037}" destId="{30727B0D-A5A2-6040-832D-1FEA51B39211}" srcOrd="0" destOrd="0" presId="urn:microsoft.com/office/officeart/2005/8/layout/process1"/>
+    <dgm:cxn modelId="{D68FBD28-ABDE-E646-9D2A-6F033E5F7F06}" srcId="{CAE66A96-6D2D-4E48-993F-20FD0D8835A2}" destId="{6A7A875F-4394-0B40-9758-0CFDD6C55FE4}" srcOrd="1" destOrd="0" parTransId="{6A5E29DB-F035-DA48-8A0C-5CED290954F9}" sibTransId="{D54BB76F-8CD5-6740-B92A-F752CBE3D216}"/>
+    <dgm:cxn modelId="{E78FCA4E-68AF-9F4C-9F77-999C158A1261}" type="presOf" srcId="{D54BB76F-8CD5-6740-B92A-F752CBE3D216}" destId="{B07BBFF5-8EF9-6748-8756-6CEAEC103A47}" srcOrd="1" destOrd="0" presId="urn:microsoft.com/office/officeart/2005/8/layout/process1"/>
+    <dgm:cxn modelId="{4BEB65F0-1392-3746-9D66-FA5736B7A951}" srcId="{CAE66A96-6D2D-4E48-993F-20FD0D8835A2}" destId="{F46E8E59-0BF1-944D-8CAE-EEF4476AB9A0}" srcOrd="0" destOrd="0" parTransId="{8905DDF5-CEAD-614D-B09C-E8EF7F71900D}" sibTransId="{E6DFE555-0069-9E4D-8E5B-77B1887F5C3E}"/>
+    <dgm:cxn modelId="{8BC49C73-BF54-FA48-BFA0-35524288C9EC}" type="presOf" srcId="{D54BB76F-8CD5-6740-B92A-F752CBE3D216}" destId="{9C03E513-11AB-1148-9211-7650583DF686}" srcOrd="0" destOrd="0" presId="urn:microsoft.com/office/officeart/2005/8/layout/process1"/>
     <dgm:cxn modelId="{0DF10BC0-F2C8-314D-BA92-034EEA5F114A}" type="presOf" srcId="{E6DFE555-0069-9E4D-8E5B-77B1887F5C3E}" destId="{678874ED-5C0F-964A-97B1-D30ABE47E41F}" srcOrd="1" destOrd="0" presId="urn:microsoft.com/office/officeart/2005/8/layout/process1"/>
-    <dgm:cxn modelId="{882B2162-D62E-DC44-88ED-F3FED9879E73}" type="presOf" srcId="{4019908C-57A4-4D48-86A3-1368FA9CE053}" destId="{C7FAAE15-C569-E348-A0C4-D51228C93A74}" srcOrd="0" destOrd="0" presId="urn:microsoft.com/office/officeart/2005/8/layout/process1"/>
-    <dgm:cxn modelId="{8BC49C73-BF54-FA48-BFA0-35524288C9EC}" type="presOf" srcId="{D54BB76F-8CD5-6740-B92A-F752CBE3D216}" destId="{9C03E513-11AB-1148-9211-7650583DF686}" srcOrd="0" destOrd="0" presId="urn:microsoft.com/office/officeart/2005/8/layout/process1"/>
     <dgm:cxn modelId="{1F21EA6E-607A-1B40-A61B-F9CE8A4A18CA}" type="presOf" srcId="{F46E8E59-0BF1-944D-8CAE-EEF4476AB9A0}" destId="{95DE3ED6-8224-1545-A420-775DB23504B4}" srcOrd="0" destOrd="0" presId="urn:microsoft.com/office/officeart/2005/8/layout/process1"/>
-    <dgm:cxn modelId="{E78FCA4E-68AF-9F4C-9F77-999C158A1261}" type="presOf" srcId="{D54BB76F-8CD5-6740-B92A-F752CBE3D216}" destId="{B07BBFF5-8EF9-6748-8756-6CEAEC103A47}" srcOrd="1" destOrd="0" presId="urn:microsoft.com/office/officeart/2005/8/layout/process1"/>
-    <dgm:cxn modelId="{52469562-9EE7-244E-900F-862205684F68}" type="presOf" srcId="{7A4E99D3-588D-3546-BA01-6122DABE3037}" destId="{30727B0D-A5A2-6040-832D-1FEA51B39211}" srcOrd="0" destOrd="0" presId="urn:microsoft.com/office/officeart/2005/8/layout/process1"/>
-    <dgm:cxn modelId="{04AC0B24-7831-FF4B-B39D-A488E150D879}" type="presOf" srcId="{5CBE3E40-A51B-A347-AA7D-FE972F4A854E}" destId="{66B397A5-31BB-7E47-B7AC-C886C844D54C}" srcOrd="0" destOrd="0" presId="urn:microsoft.com/office/officeart/2005/8/layout/process1"/>
-    <dgm:cxn modelId="{D68FBD28-ABDE-E646-9D2A-6F033E5F7F06}" srcId="{CAE66A96-6D2D-4E48-993F-20FD0D8835A2}" destId="{6A7A875F-4394-0B40-9758-0CFDD6C55FE4}" srcOrd="1" destOrd="0" parTransId="{6A5E29DB-F035-DA48-8A0C-5CED290954F9}" sibTransId="{D54BB76F-8CD5-6740-B92A-F752CBE3D216}"/>
-    <dgm:cxn modelId="{4BEB65F0-1392-3746-9D66-FA5736B7A951}" srcId="{CAE66A96-6D2D-4E48-993F-20FD0D8835A2}" destId="{F46E8E59-0BF1-944D-8CAE-EEF4476AB9A0}" srcOrd="0" destOrd="0" parTransId="{8905DDF5-CEAD-614D-B09C-E8EF7F71900D}" sibTransId="{E6DFE555-0069-9E4D-8E5B-77B1887F5C3E}"/>
     <dgm:cxn modelId="{B5D45B4F-51E7-C44B-ABF1-9FE933B84E64}" type="presParOf" srcId="{2CD4D39A-1097-8249-9825-6CD1BEDFF85A}" destId="{95DE3ED6-8224-1545-A420-775DB23504B4}" srcOrd="0" destOrd="0" presId="urn:microsoft.com/office/officeart/2005/8/layout/process1"/>
     <dgm:cxn modelId="{71572754-EAE4-DC45-9295-BE929E70F57D}" type="presParOf" srcId="{2CD4D39A-1097-8249-9825-6CD1BEDFF85A}" destId="{302C9ED6-3EF6-A04A-A98F-7A577D6896F9}" srcOrd="1" destOrd="0" presId="urn:microsoft.com/office/officeart/2005/8/layout/process1"/>
     <dgm:cxn modelId="{516C5543-E3C8-2146-9607-F406893495F2}" type="presParOf" srcId="{302C9ED6-3EF6-A04A-A98F-7A577D6896F9}" destId="{678874ED-5C0F-964A-97B1-D30ABE47E41F}" srcOrd="0" destOrd="0" presId="urn:microsoft.com/office/officeart/2005/8/layout/process1"/>
@@ -7441,7 +7630,7 @@
           <a:p>
             <a:fld id="{216C5678-EE20-4FA5-88E2-6E0BD67A2E26}" type="datetime1">
               <a:rPr lang="en-US" smtClean="0"/>
-              <a:t>11/27/12</a:t>
+              <a:t>12/6/12</a:t>
             </a:fld>
             <a:endParaRPr lang="en-US" dirty="0"/>
           </a:p>
@@ -7611,7 +7800,7 @@
           <a:p>
             <a:fld id="{EA051B39-B140-43FE-96DB-472A2B59CE7C}" type="datetime1">
               <a:rPr lang="en-US" smtClean="0"/>
-              <a:t>11/27/12</a:t>
+              <a:t>12/6/12</a:t>
             </a:fld>
             <a:endParaRPr lang="en-US"/>
           </a:p>
@@ -7791,7 +7980,7 @@
           <a:p>
             <a:fld id="{DA600BB2-27C5-458B-ABCE-839C88CF47CE}" type="datetime1">
               <a:rPr lang="en-US" smtClean="0"/>
-              <a:t>11/27/12</a:t>
+              <a:t>12/6/12</a:t>
             </a:fld>
             <a:endParaRPr lang="en-US"/>
           </a:p>
@@ -7979,7 +8168,7 @@
           <a:p>
             <a:fld id="{B11D738E-8962-435F-8C43-147B8DD7E819}" type="datetime1">
               <a:rPr lang="en-US" smtClean="0"/>
-              <a:t>11/27/12</a:t>
+              <a:t>12/6/12</a:t>
             </a:fld>
             <a:endParaRPr lang="en-US"/>
           </a:p>
@@ -8246,7 +8435,7 @@
           <a:p>
             <a:fld id="{09CAEA93-55E7-4DA9-90C2-089A26EEFEC4}" type="datetime1">
               <a:rPr lang="en-US" smtClean="0"/>
-              <a:t>11/27/12</a:t>
+              <a:t>12/6/12</a:t>
             </a:fld>
             <a:endParaRPr lang="en-US"/>
           </a:p>
@@ -8599,7 +8788,7 @@
           <a:p>
             <a:fld id="{E34CF3C7-6809-4F39-BD67-A75817BDDE0A}" type="datetime1">
               <a:rPr lang="en-US" smtClean="0"/>
-              <a:t>11/27/12</a:t>
+              <a:t>12/6/12</a:t>
             </a:fld>
             <a:endParaRPr lang="en-US"/>
           </a:p>
@@ -8912,7 +9101,7 @@
           <a:p>
             <a:fld id="{F7EAEB24-CE78-465C-A726-91D0868FA48F}" type="datetime1">
               <a:rPr lang="en-US" smtClean="0"/>
-              <a:t>11/27/12</a:t>
+              <a:t>12/6/12</a:t>
             </a:fld>
             <a:endParaRPr lang="en-US"/>
           </a:p>
@@ -9144,7 +9333,7 @@
           <a:p>
             <a:fld id="{40BAADF0-1749-4E8B-9691-B44A5F8C0895}" type="datetime1">
               <a:rPr lang="en-US" smtClean="0"/>
-              <a:t>11/27/12</a:t>
+              <a:t>12/6/12</a:t>
             </a:fld>
             <a:endParaRPr lang="en-US"/>
           </a:p>
@@ -9239,7 +9428,7 @@
           <a:p>
             <a:fld id="{A8AF628A-A867-4937-BBE5-207DB6F9C51A}" type="datetime1">
               <a:rPr lang="en-US" smtClean="0"/>
-              <a:t>11/27/12</a:t>
+              <a:t>12/6/12</a:t>
             </a:fld>
             <a:endParaRPr lang="en-US"/>
           </a:p>
@@ -9532,7 +9721,7 @@
           <a:p>
             <a:fld id="{118BBB94-68E6-4675-A946-F1C5994EDBD7}" type="datetime1">
               <a:rPr lang="en-US" smtClean="0"/>
-              <a:t>11/27/12</a:t>
+              <a:t>12/6/12</a:t>
             </a:fld>
             <a:endParaRPr lang="en-US"/>
           </a:p>
@@ -9806,7 +9995,7 @@
           <a:p>
             <a:fld id="{DC3B8377-21E3-4835-B75D-4E2847E2750F}" type="datetime1">
               <a:rPr lang="en-US" smtClean="0"/>
-              <a:t>11/27/12</a:t>
+              <a:t>12/6/12</a:t>
             </a:fld>
             <a:endParaRPr lang="en-US"/>
           </a:p>
@@ -10021,7 +10210,7 @@
           <a:p>
             <a:fld id="{B0C4986D-6BE9-4264-908F-02DB36FD8D6C}" type="datetime1">
               <a:rPr lang="en-US" smtClean="0"/>
-              <a:t>11/27/12</a:t>
+              <a:t>12/6/12</a:t>
             </a:fld>
             <a:endParaRPr lang="en-US" dirty="0"/>
           </a:p>
@@ -11892,17 +12081,25 @@
             </a:pPr>
             <a:r>
               <a:rPr lang="en-US" dirty="0" smtClean="0"/>
-              <a:t>To run the program, simply click the </a:t>
+              <a:t>To run the program, </a:t>
+            </a:r>
+            <a:r>
+              <a:rPr lang="en-US" dirty="0" smtClean="0"/>
+              <a:t>run the </a:t>
             </a:r>
             <a:r>
               <a:rPr lang="en-US" dirty="0" err="1" smtClean="0"/>
-              <a:t>root.jar</a:t>
+              <a:t>JFileBrowser</a:t>
             </a:r>
             <a:r>
               <a:rPr lang="en-US" dirty="0" smtClean="0"/>
-              <a:t> file.</a:t>
-            </a:r>
-            <a:endParaRPr lang="en-US" dirty="0"/>
+              <a:t> class in </a:t>
+            </a:r>
+            <a:r>
+              <a:rPr lang="en-US" smtClean="0"/>
+              <a:t>eclipse.</a:t>
+            </a:r>
+            <a:endParaRPr lang="en-US" dirty="0" smtClean="0"/>
           </a:p>
         </p:txBody>
       </p:sp>

</xml_diff>